<commit_message>
update .NET class library Windows SDK path closing presentation
</commit_message>
<xml_diff>
--- a/dotnetconf/Technical/Decks/Aaron_NetStandard/Build Great Libraries using .NET Standard-Aaron.pptx
+++ b/dotnetconf/Technical/Decks/Aaron_NetStandard/Build Great Libraries using .NET Standard-Aaron.pptx
@@ -2745,7 +2745,7 @@
           <a:p>
             <a:fld id="{38EEC551-8CDA-4EB6-89BB-2A86C9F091C8}" type="datetime8">
               <a:rPr lang="en-US" smtClean="0"/>
-              <a:t>10/27/2018 1:46 AM</a:t>
+              <a:t>10/27/2018 12:02 PM</a:t>
             </a:fld>
             <a:endParaRPr lang="en-US" dirty="0"/>
           </a:p>
@@ -2929,7 +2929,7 @@
           <a:p>
             <a:fld id="{38EEC551-8CDA-4EB6-89BB-2A86C9F091C8}" type="datetime8">
               <a:rPr lang="en-US" smtClean="0"/>
-              <a:t>10/27/2018 1:46 AM</a:t>
+              <a:t>10/27/2018 12:02 PM</a:t>
             </a:fld>
             <a:endParaRPr lang="en-US" dirty="0"/>
           </a:p>
@@ -3278,7 +3278,7 @@
           <a:p>
             <a:fld id="{38EEC551-8CDA-4EB6-89BB-2A86C9F091C8}" type="datetime8">
               <a:rPr lang="en-US" smtClean="0"/>
-              <a:t>10/27/2018 1:45 AM</a:t>
+              <a:t>10/27/2018 12:02 PM</a:t>
             </a:fld>
             <a:endParaRPr lang="en-US" dirty="0"/>
           </a:p>
@@ -11076,16 +11076,12 @@
               <a:rPr lang="en-US" sz="5400" dirty="0"/>
             </a:br>
             <a:r>
-              <a:rPr lang="en-US" sz="5400" dirty="0"/>
-              <a:t>your .</a:t>
-            </a:r>
-            <a:r>
               <a:rPr lang="en-US" sz="5400"/>
-              <a:t>NET </a:t>
+              <a:t>your </a:t>
             </a:r>
             <a:r>
               <a:rPr lang="en-US" sz="5400" smtClean="0"/>
-              <a:t>Framework / .NET Core</a:t>
+              <a:t>.NET Core</a:t>
             </a:r>
             <a:endParaRPr lang="en-US" sz="5400" dirty="0"/>
           </a:p>
@@ -12924,6 +12920,34 @@
             <a:r>
               <a:rPr lang="en-US" dirty="0"/>
               <a:t>C:\Program Files (x86)\Microsoft Visual Studio 14.0\VC&gt;ildasm.exe</a:t>
+            </a:r>
+          </a:p>
+        </p:txBody>
+      </p:sp>
+      <p:sp>
+        <p:nvSpPr>
+          <p:cNvPr id="5" name="Rectangle 4"/>
+          <p:cNvSpPr/>
+          <p:nvPr/>
+        </p:nvSpPr>
+        <p:spPr>
+          <a:xfrm>
+            <a:off x="1824506" y="5514184"/>
+            <a:ext cx="8388439" cy="369332"/>
+          </a:xfrm>
+          <a:prstGeom prst="rect">
+            <a:avLst/>
+          </a:prstGeom>
+        </p:spPr>
+        <p:txBody>
+          <a:bodyPr wrap="square">
+            <a:spAutoFit/>
+          </a:bodyPr>
+          <a:lstStyle/>
+          <a:p>
+            <a:r>
+              <a:rPr lang="en-US" dirty="0"/>
+              <a:t>C:\Program Files (x86)\Microsoft SDKs\Windows\v10.0A\bin\NETFX 4.7.2 Tools</a:t>
             </a:r>
           </a:p>
         </p:txBody>

</xml_diff>